<commit_message>
added DR_ViewerApp images in case the demo fails live
</commit_message>
<xml_diff>
--- a/docs/HNSCC_functional_assay_pipeline_development_rev002.pptx
+++ b/docs/HNSCC_functional_assay_pipeline_development_rev002.pptx
@@ -5,7 +5,7 @@
     <p:sldMasterId id="2147483648" r:id="rId1"/>
   </p:sldMasterIdLst>
   <p:notesMasterIdLst>
-    <p:notesMasterId r:id="rId17"/>
+    <p:notesMasterId r:id="rId18"/>
   </p:notesMasterIdLst>
   <p:sldIdLst>
     <p:sldId id="256" r:id="rId2"/>
@@ -20,9 +20,10 @@
     <p:sldId id="277" r:id="rId11"/>
     <p:sldId id="278" r:id="rId12"/>
     <p:sldId id="279" r:id="rId13"/>
-    <p:sldId id="268" r:id="rId14"/>
-    <p:sldId id="266" r:id="rId15"/>
-    <p:sldId id="280" r:id="rId16"/>
+    <p:sldId id="281" r:id="rId14"/>
+    <p:sldId id="268" r:id="rId15"/>
+    <p:sldId id="266" r:id="rId16"/>
+    <p:sldId id="280" r:id="rId17"/>
   </p:sldIdLst>
   <p:sldSz cx="12192000" cy="6858000"/>
   <p:notesSz cx="6858000" cy="9144000"/>
@@ -4495,6 +4496,291 @@
           <p:cNvPr id="2" name="Title 1">
             <a:extLst>
               <a:ext uri="{FF2B5EF4-FFF2-40B4-BE49-F238E27FC236}">
+                <a16:creationId xmlns:a16="http://schemas.microsoft.com/office/drawing/2014/main" id="{75554CAB-32FE-4B91-BCB1-8C27D4BF6840}"/>
+              </a:ext>
+            </a:extLst>
+          </p:cNvPr>
+          <p:cNvSpPr>
+            <a:spLocks noGrp="1"/>
+          </p:cNvSpPr>
+          <p:nvPr>
+            <p:ph type="title"/>
+          </p:nvPr>
+        </p:nvSpPr>
+        <p:spPr/>
+        <p:txBody>
+          <a:bodyPr/>
+          <a:lstStyle/>
+          <a:p>
+            <a:r>
+              <a:rPr lang="en-US" dirty="0" err="1"/>
+              <a:t>DR_ViewerApp</a:t>
+            </a:r>
+            <a:endParaRPr lang="en-US" dirty="0"/>
+          </a:p>
+        </p:txBody>
+      </p:sp>
+      <p:pic>
+        <p:nvPicPr>
+          <p:cNvPr id="7" name="Picture 6">
+            <a:extLst>
+              <a:ext uri="{FF2B5EF4-FFF2-40B4-BE49-F238E27FC236}">
+                <a16:creationId xmlns:a16="http://schemas.microsoft.com/office/drawing/2014/main" id="{FEB5DF32-20B4-4A1A-85EE-E4B31CA5E263}"/>
+              </a:ext>
+            </a:extLst>
+          </p:cNvPr>
+          <p:cNvPicPr>
+            <a:picLocks noChangeAspect="1"/>
+          </p:cNvPicPr>
+          <p:nvPr/>
+        </p:nvPicPr>
+        <p:blipFill>
+          <a:blip r:embed="rId2"/>
+          <a:stretch>
+            <a:fillRect/>
+          </a:stretch>
+        </p:blipFill>
+        <p:spPr>
+          <a:xfrm>
+            <a:off x="3400377" y="1427715"/>
+            <a:ext cx="6132243" cy="5080400"/>
+          </a:xfrm>
+          <a:prstGeom prst="rect">
+            <a:avLst/>
+          </a:prstGeom>
+        </p:spPr>
+      </p:pic>
+      <p:pic>
+        <p:nvPicPr>
+          <p:cNvPr id="5" name="Picture 4">
+            <a:extLst>
+              <a:ext uri="{FF2B5EF4-FFF2-40B4-BE49-F238E27FC236}">
+                <a16:creationId xmlns:a16="http://schemas.microsoft.com/office/drawing/2014/main" id="{428771E2-21EC-4AC9-A772-3BA37AA4B52A}"/>
+              </a:ext>
+            </a:extLst>
+          </p:cNvPr>
+          <p:cNvPicPr>
+            <a:picLocks noChangeAspect="1"/>
+          </p:cNvPicPr>
+          <p:nvPr/>
+        </p:nvPicPr>
+        <p:blipFill>
+          <a:blip r:embed="rId3"/>
+          <a:stretch>
+            <a:fillRect/>
+          </a:stretch>
+        </p:blipFill>
+        <p:spPr>
+          <a:xfrm>
+            <a:off x="2906255" y="1442955"/>
+            <a:ext cx="6626365" cy="5080400"/>
+          </a:xfrm>
+          <a:prstGeom prst="rect">
+            <a:avLst/>
+          </a:prstGeom>
+        </p:spPr>
+      </p:pic>
+      <p:pic>
+        <p:nvPicPr>
+          <p:cNvPr id="6" name="Picture 5">
+            <a:extLst>
+              <a:ext uri="{FF2B5EF4-FFF2-40B4-BE49-F238E27FC236}">
+                <a16:creationId xmlns:a16="http://schemas.microsoft.com/office/drawing/2014/main" id="{05E06DEF-054E-45A2-83C2-96AAD8C023C3}"/>
+              </a:ext>
+            </a:extLst>
+          </p:cNvPr>
+          <p:cNvPicPr>
+            <a:picLocks noChangeAspect="1"/>
+          </p:cNvPicPr>
+          <p:nvPr/>
+        </p:nvPicPr>
+        <p:blipFill>
+          <a:blip r:embed="rId4"/>
+          <a:stretch>
+            <a:fillRect/>
+          </a:stretch>
+        </p:blipFill>
+        <p:spPr>
+          <a:xfrm>
+            <a:off x="2906254" y="1427715"/>
+            <a:ext cx="6626365" cy="5356405"/>
+          </a:xfrm>
+          <a:prstGeom prst="rect">
+            <a:avLst/>
+          </a:prstGeom>
+        </p:spPr>
+      </p:pic>
+    </p:spTree>
+    <p:extLst>
+      <p:ext uri="{BB962C8B-B14F-4D97-AF65-F5344CB8AC3E}">
+        <p14:creationId xmlns:p14="http://schemas.microsoft.com/office/powerpoint/2010/main" val="2623584664"/>
+      </p:ext>
+    </p:extLst>
+  </p:cSld>
+  <p:clrMapOvr>
+    <a:masterClrMapping/>
+  </p:clrMapOvr>
+  <p:timing>
+    <p:tnLst>
+      <p:par>
+        <p:cTn id="1" dur="indefinite" restart="never" nodeType="tmRoot">
+          <p:childTnLst>
+            <p:seq concurrent="1" nextAc="seek">
+              <p:cTn id="2" dur="indefinite" nodeType="mainSeq">
+                <p:childTnLst>
+                  <p:par>
+                    <p:cTn id="3" fill="hold">
+                      <p:stCondLst>
+                        <p:cond delay="indefinite"/>
+                      </p:stCondLst>
+                      <p:childTnLst>
+                        <p:par>
+                          <p:cTn id="4" fill="hold">
+                            <p:stCondLst>
+                              <p:cond delay="0"/>
+                            </p:stCondLst>
+                            <p:childTnLst>
+                              <p:par>
+                                <p:cTn id="5" presetID="10" presetClass="entr" presetSubtype="0" fill="hold" nodeType="clickEffect">
+                                  <p:stCondLst>
+                                    <p:cond delay="0"/>
+                                  </p:stCondLst>
+                                  <p:childTnLst>
+                                    <p:set>
+                                      <p:cBhvr>
+                                        <p:cTn id="6" dur="1" fill="hold">
+                                          <p:stCondLst>
+                                            <p:cond delay="0"/>
+                                          </p:stCondLst>
+                                        </p:cTn>
+                                        <p:tgtEl>
+                                          <p:spTgt spid="5"/>
+                                        </p:tgtEl>
+                                        <p:attrNameLst>
+                                          <p:attrName>style.visibility</p:attrName>
+                                        </p:attrNameLst>
+                                      </p:cBhvr>
+                                      <p:to>
+                                        <p:strVal val="visible"/>
+                                      </p:to>
+                                    </p:set>
+                                    <p:animEffect transition="in" filter="fade">
+                                      <p:cBhvr>
+                                        <p:cTn id="7" dur="500"/>
+                                        <p:tgtEl>
+                                          <p:spTgt spid="5"/>
+                                        </p:tgtEl>
+                                      </p:cBhvr>
+                                    </p:animEffect>
+                                  </p:childTnLst>
+                                </p:cTn>
+                              </p:par>
+                            </p:childTnLst>
+                          </p:cTn>
+                        </p:par>
+                      </p:childTnLst>
+                    </p:cTn>
+                  </p:par>
+                  <p:par>
+                    <p:cTn id="8" fill="hold">
+                      <p:stCondLst>
+                        <p:cond delay="indefinite"/>
+                      </p:stCondLst>
+                      <p:childTnLst>
+                        <p:par>
+                          <p:cTn id="9" fill="hold">
+                            <p:stCondLst>
+                              <p:cond delay="0"/>
+                            </p:stCondLst>
+                            <p:childTnLst>
+                              <p:par>
+                                <p:cTn id="10" presetID="10" presetClass="entr" presetSubtype="0" fill="hold" nodeType="clickEffect">
+                                  <p:stCondLst>
+                                    <p:cond delay="0"/>
+                                  </p:stCondLst>
+                                  <p:childTnLst>
+                                    <p:set>
+                                      <p:cBhvr>
+                                        <p:cTn id="11" dur="1" fill="hold">
+                                          <p:stCondLst>
+                                            <p:cond delay="0"/>
+                                          </p:stCondLst>
+                                        </p:cTn>
+                                        <p:tgtEl>
+                                          <p:spTgt spid="6"/>
+                                        </p:tgtEl>
+                                        <p:attrNameLst>
+                                          <p:attrName>style.visibility</p:attrName>
+                                        </p:attrNameLst>
+                                      </p:cBhvr>
+                                      <p:to>
+                                        <p:strVal val="visible"/>
+                                      </p:to>
+                                    </p:set>
+                                    <p:animEffect transition="in" filter="fade">
+                                      <p:cBhvr>
+                                        <p:cTn id="12" dur="500"/>
+                                        <p:tgtEl>
+                                          <p:spTgt spid="6"/>
+                                        </p:tgtEl>
+                                      </p:cBhvr>
+                                    </p:animEffect>
+                                  </p:childTnLst>
+                                </p:cTn>
+                              </p:par>
+                            </p:childTnLst>
+                          </p:cTn>
+                        </p:par>
+                      </p:childTnLst>
+                    </p:cTn>
+                  </p:par>
+                </p:childTnLst>
+              </p:cTn>
+              <p:prevCondLst>
+                <p:cond evt="onPrev" delay="0">
+                  <p:tgtEl>
+                    <p:sldTgt/>
+                  </p:tgtEl>
+                </p:cond>
+              </p:prevCondLst>
+              <p:nextCondLst>
+                <p:cond evt="onNext" delay="0">
+                  <p:tgtEl>
+                    <p:sldTgt/>
+                  </p:tgtEl>
+                </p:cond>
+              </p:nextCondLst>
+            </p:seq>
+          </p:childTnLst>
+        </p:cTn>
+      </p:par>
+    </p:tnLst>
+  </p:timing>
+</p:sld>
+</file>
+
+<file path=ppt/slides/slide14.xml><?xml version="1.0" encoding="utf-8"?>
+<p:sld xmlns:a="http://schemas.openxmlformats.org/drawingml/2006/main" xmlns:r="http://schemas.openxmlformats.org/officeDocument/2006/relationships" xmlns:p="http://schemas.openxmlformats.org/presentationml/2006/main">
+  <p:cSld>
+    <p:spTree>
+      <p:nvGrpSpPr>
+        <p:cNvPr id="1" name=""/>
+        <p:cNvGrpSpPr/>
+        <p:nvPr/>
+      </p:nvGrpSpPr>
+      <p:grpSpPr>
+        <a:xfrm>
+          <a:off x="0" y="0"/>
+          <a:ext cx="0" cy="0"/>
+          <a:chOff x="0" y="0"/>
+          <a:chExt cx="0" cy="0"/>
+        </a:xfrm>
+      </p:grpSpPr>
+      <p:sp>
+        <p:nvSpPr>
+          <p:cNvPr id="2" name="Title 1">
+            <a:extLst>
+              <a:ext uri="{FF2B5EF4-FFF2-40B4-BE49-F238E27FC236}">
                 <a16:creationId xmlns:a16="http://schemas.microsoft.com/office/drawing/2014/main" id="{0297ABED-367A-460C-9255-A4FDF04EAED2}"/>
               </a:ext>
             </a:extLst>
@@ -4617,7 +4903,7 @@
 </p:sld>
 </file>
 
-<file path=ppt/slides/slide14.xml><?xml version="1.0" encoding="utf-8"?>
+<file path=ppt/slides/slide15.xml><?xml version="1.0" encoding="utf-8"?>
 <p:sld xmlns:a="http://schemas.openxmlformats.org/drawingml/2006/main" xmlns:r="http://schemas.openxmlformats.org/officeDocument/2006/relationships" xmlns:p="http://schemas.openxmlformats.org/presentationml/2006/main">
   <p:cSld>
     <p:spTree>
@@ -4794,7 +5080,7 @@
 </p:sld>
 </file>
 
-<file path=ppt/slides/slide15.xml><?xml version="1.0" encoding="utf-8"?>
+<file path=ppt/slides/slide16.xml><?xml version="1.0" encoding="utf-8"?>
 <p:sld xmlns:a="http://schemas.openxmlformats.org/drawingml/2006/main" xmlns:r="http://schemas.openxmlformats.org/officeDocument/2006/relationships" xmlns:p="http://schemas.openxmlformats.org/presentationml/2006/main">
   <p:cSld>
     <p:spTree>
@@ -15105,15 +15391,7 @@
           <a:p>
             <a:r>
               <a:rPr lang="en-US" dirty="0"/>
-              <a:t>All code and documentation is stored in a </a:t>
-            </a:r>
-            <a:r>
-              <a:rPr lang="en-US" i="1" dirty="0"/>
-              <a:t>private</a:t>
-            </a:r>
-            <a:r>
-              <a:rPr lang="en-US" dirty="0"/>
-              <a:t> </a:t>
+              <a:t>All code and documentation is stored in a private </a:t>
             </a:r>
             <a:r>
               <a:rPr lang="en-US" dirty="0" err="1"/>

</xml_diff>

<commit_message>
minor presentation changes; added sensitive assignment to inhibitor-level dr plot
</commit_message>
<xml_diff>
--- a/docs/HNSCC_functional_assay_pipeline_development_rev002.pptx
+++ b/docs/HNSCC_functional_assay_pipeline_development_rev002.pptx
@@ -5,25 +5,23 @@
     <p:sldMasterId id="2147483648" r:id="rId1"/>
   </p:sldMasterIdLst>
   <p:notesMasterIdLst>
-    <p:notesMasterId r:id="rId18"/>
+    <p:notesMasterId r:id="rId16"/>
   </p:notesMasterIdLst>
   <p:sldIdLst>
     <p:sldId id="256" r:id="rId2"/>
-    <p:sldId id="257" r:id="rId3"/>
-    <p:sldId id="275" r:id="rId4"/>
-    <p:sldId id="274" r:id="rId5"/>
-    <p:sldId id="263" r:id="rId6"/>
-    <p:sldId id="271" r:id="rId7"/>
-    <p:sldId id="272" r:id="rId8"/>
-    <p:sldId id="273" r:id="rId9"/>
-    <p:sldId id="276" r:id="rId10"/>
-    <p:sldId id="277" r:id="rId11"/>
-    <p:sldId id="278" r:id="rId12"/>
-    <p:sldId id="279" r:id="rId13"/>
-    <p:sldId id="281" r:id="rId14"/>
-    <p:sldId id="268" r:id="rId15"/>
-    <p:sldId id="266" r:id="rId16"/>
-    <p:sldId id="280" r:id="rId17"/>
+    <p:sldId id="274" r:id="rId3"/>
+    <p:sldId id="263" r:id="rId4"/>
+    <p:sldId id="271" r:id="rId5"/>
+    <p:sldId id="272" r:id="rId6"/>
+    <p:sldId id="273" r:id="rId7"/>
+    <p:sldId id="276" r:id="rId8"/>
+    <p:sldId id="277" r:id="rId9"/>
+    <p:sldId id="278" r:id="rId10"/>
+    <p:sldId id="279" r:id="rId11"/>
+    <p:sldId id="281" r:id="rId12"/>
+    <p:sldId id="268" r:id="rId13"/>
+    <p:sldId id="266" r:id="rId14"/>
+    <p:sldId id="280" r:id="rId15"/>
   </p:sldIdLst>
   <p:sldSz cx="12192000" cy="6858000"/>
   <p:notesSz cx="6858000" cy="9144000"/>
@@ -224,7 +222,7 @@
           <a:p>
             <a:fld id="{03E01548-1D72-4C9E-955C-FCF8595D27B1}" type="datetimeFigureOut">
               <a:rPr lang="en-US" smtClean="0"/>
-              <a:t>9/5/2019</a:t>
+              <a:t>9/6/2019</a:t>
             </a:fld>
             <a:endParaRPr lang="en-US"/>
           </a:p>
@@ -597,7 +595,7 @@
           <a:p>
             <a:fld id="{E043295F-FF0C-4BD5-BC13-C43EC879DBCC}" type="slidenum">
               <a:rPr lang="en-US" smtClean="0"/>
-              <a:t>6</a:t>
+              <a:t>4</a:t>
             </a:fld>
             <a:endParaRPr lang="en-US"/>
           </a:p>
@@ -709,7 +707,7 @@
           <a:p>
             <a:fld id="{E043295F-FF0C-4BD5-BC13-C43EC879DBCC}" type="slidenum">
               <a:rPr lang="en-US" smtClean="0"/>
-              <a:t>7</a:t>
+              <a:t>5</a:t>
             </a:fld>
             <a:endParaRPr lang="en-US"/>
           </a:p>
@@ -875,7 +873,7 @@
           <a:p>
             <a:fld id="{ABBD65A0-F140-476D-B606-1C9D07B9F5C7}" type="datetimeFigureOut">
               <a:rPr lang="en-US" smtClean="0"/>
-              <a:t>9/5/2019</a:t>
+              <a:t>9/6/2019</a:t>
             </a:fld>
             <a:endParaRPr lang="en-US"/>
           </a:p>
@@ -1073,7 +1071,7 @@
           <a:p>
             <a:fld id="{ABBD65A0-F140-476D-B606-1C9D07B9F5C7}" type="datetimeFigureOut">
               <a:rPr lang="en-US" smtClean="0"/>
-              <a:t>9/5/2019</a:t>
+              <a:t>9/6/2019</a:t>
             </a:fld>
             <a:endParaRPr lang="en-US"/>
           </a:p>
@@ -1281,7 +1279,7 @@
           <a:p>
             <a:fld id="{ABBD65A0-F140-476D-B606-1C9D07B9F5C7}" type="datetimeFigureOut">
               <a:rPr lang="en-US" smtClean="0"/>
-              <a:t>9/5/2019</a:t>
+              <a:t>9/6/2019</a:t>
             </a:fld>
             <a:endParaRPr lang="en-US"/>
           </a:p>
@@ -1479,7 +1477,7 @@
           <a:p>
             <a:fld id="{ABBD65A0-F140-476D-B606-1C9D07B9F5C7}" type="datetimeFigureOut">
               <a:rPr lang="en-US" smtClean="0"/>
-              <a:t>9/5/2019</a:t>
+              <a:t>9/6/2019</a:t>
             </a:fld>
             <a:endParaRPr lang="en-US"/>
           </a:p>
@@ -1754,7 +1752,7 @@
           <a:p>
             <a:fld id="{ABBD65A0-F140-476D-B606-1C9D07B9F5C7}" type="datetimeFigureOut">
               <a:rPr lang="en-US" smtClean="0"/>
-              <a:t>9/5/2019</a:t>
+              <a:t>9/6/2019</a:t>
             </a:fld>
             <a:endParaRPr lang="en-US"/>
           </a:p>
@@ -2019,7 +2017,7 @@
           <a:p>
             <a:fld id="{ABBD65A0-F140-476D-B606-1C9D07B9F5C7}" type="datetimeFigureOut">
               <a:rPr lang="en-US" smtClean="0"/>
-              <a:t>9/5/2019</a:t>
+              <a:t>9/6/2019</a:t>
             </a:fld>
             <a:endParaRPr lang="en-US"/>
           </a:p>
@@ -2431,7 +2429,7 @@
           <a:p>
             <a:fld id="{ABBD65A0-F140-476D-B606-1C9D07B9F5C7}" type="datetimeFigureOut">
               <a:rPr lang="en-US" smtClean="0"/>
-              <a:t>9/5/2019</a:t>
+              <a:t>9/6/2019</a:t>
             </a:fld>
             <a:endParaRPr lang="en-US"/>
           </a:p>
@@ -2572,7 +2570,7 @@
           <a:p>
             <a:fld id="{ABBD65A0-F140-476D-B606-1C9D07B9F5C7}" type="datetimeFigureOut">
               <a:rPr lang="en-US" smtClean="0"/>
-              <a:t>9/5/2019</a:t>
+              <a:t>9/6/2019</a:t>
             </a:fld>
             <a:endParaRPr lang="en-US"/>
           </a:p>
@@ -2685,7 +2683,7 @@
           <a:p>
             <a:fld id="{ABBD65A0-F140-476D-B606-1C9D07B9F5C7}" type="datetimeFigureOut">
               <a:rPr lang="en-US" smtClean="0"/>
-              <a:t>9/5/2019</a:t>
+              <a:t>9/6/2019</a:t>
             </a:fld>
             <a:endParaRPr lang="en-US"/>
           </a:p>
@@ -2996,7 +2994,7 @@
           <a:p>
             <a:fld id="{ABBD65A0-F140-476D-B606-1C9D07B9F5C7}" type="datetimeFigureOut">
               <a:rPr lang="en-US" smtClean="0"/>
-              <a:t>9/5/2019</a:t>
+              <a:t>9/6/2019</a:t>
             </a:fld>
             <a:endParaRPr lang="en-US"/>
           </a:p>
@@ -3284,7 +3282,7 @@
           <a:p>
             <a:fld id="{ABBD65A0-F140-476D-B606-1C9D07B9F5C7}" type="datetimeFigureOut">
               <a:rPr lang="en-US" smtClean="0"/>
-              <a:t>9/5/2019</a:t>
+              <a:t>9/6/2019</a:t>
             </a:fld>
             <a:endParaRPr lang="en-US"/>
           </a:p>
@@ -3525,7 +3523,7 @@
           <a:p>
             <a:fld id="{ABBD65A0-F140-476D-B606-1C9D07B9F5C7}" type="datetimeFigureOut">
               <a:rPr lang="en-US" smtClean="0"/>
-              <a:t>9/5/2019</a:t>
+              <a:t>9/6/2019</a:t>
             </a:fld>
             <a:endParaRPr lang="en-US"/>
           </a:p>
@@ -4033,338 +4031,6 @@
           <p:cNvPr id="2" name="Title 1">
             <a:extLst>
               <a:ext uri="{FF2B5EF4-FFF2-40B4-BE49-F238E27FC236}">
-                <a16:creationId xmlns:a16="http://schemas.microsoft.com/office/drawing/2014/main" id="{2AD454E4-1C22-4481-92BE-AC36DF88F7B5}"/>
-              </a:ext>
-            </a:extLst>
-          </p:cNvPr>
-          <p:cNvSpPr>
-            <a:spLocks noGrp="1"/>
-          </p:cNvSpPr>
-          <p:nvPr>
-            <p:ph type="title"/>
-          </p:nvPr>
-        </p:nvSpPr>
-        <p:spPr/>
-        <p:txBody>
-          <a:bodyPr/>
-          <a:lstStyle/>
-          <a:p>
-            <a:r>
-              <a:rPr lang="en-US" dirty="0"/>
-              <a:t>Pipeline Testing</a:t>
-            </a:r>
-          </a:p>
-        </p:txBody>
-      </p:sp>
-      <p:sp>
-        <p:nvSpPr>
-          <p:cNvPr id="3" name="Content Placeholder 2">
-            <a:extLst>
-              <a:ext uri="{FF2B5EF4-FFF2-40B4-BE49-F238E27FC236}">
-                <a16:creationId xmlns:a16="http://schemas.microsoft.com/office/drawing/2014/main" id="{40E91D2B-9D28-47DE-B864-4F474D6E7EE6}"/>
-              </a:ext>
-            </a:extLst>
-          </p:cNvPr>
-          <p:cNvSpPr>
-            <a:spLocks noGrp="1"/>
-          </p:cNvSpPr>
-          <p:nvPr>
-            <p:ph idx="1"/>
-          </p:nvPr>
-        </p:nvSpPr>
-        <p:spPr/>
-        <p:txBody>
-          <a:bodyPr/>
-          <a:lstStyle/>
-          <a:p>
-            <a:r>
-              <a:rPr lang="en-US" b="1" dirty="0" err="1"/>
-              <a:t>Doctesting</a:t>
-            </a:r>
-            <a:r>
-              <a:rPr lang="en-US" dirty="0"/>
-              <a:t> [python] </a:t>
-            </a:r>
-          </a:p>
-          <a:p>
-            <a:pPr marL="0" indent="0">
-              <a:buNone/>
-            </a:pPr>
-            <a:r>
-              <a:rPr lang="en-US" dirty="0"/>
-              <a:t> </a:t>
-            </a:r>
-          </a:p>
-          <a:p>
-            <a:r>
-              <a:rPr lang="en-US" b="1" dirty="0"/>
-              <a:t>Unit Testing: </a:t>
-            </a:r>
-            <a:r>
-              <a:rPr lang="en-US" dirty="0"/>
-              <a:t>Using Data from the </a:t>
-            </a:r>
-            <a:r>
-              <a:rPr lang="en-US" dirty="0" err="1"/>
-              <a:t>BeatAML</a:t>
-            </a:r>
-            <a:r>
-              <a:rPr lang="en-US" dirty="0"/>
-              <a:t> (Sorafenib, n=851), run the HNSCC pipeline and compare output to </a:t>
-            </a:r>
-            <a:r>
-              <a:rPr lang="en-US" dirty="0" err="1"/>
-              <a:t>BeatAML</a:t>
-            </a:r>
-            <a:r>
-              <a:rPr lang="en-US" dirty="0"/>
-              <a:t> reported values. </a:t>
-            </a:r>
-          </a:p>
-          <a:p>
-            <a:pPr lvl="2"/>
-            <a:r>
-              <a:rPr lang="en-US" dirty="0"/>
-              <a:t>Compare AUC calculation, allow deviance due to minor fitting differences </a:t>
-            </a:r>
-          </a:p>
-          <a:p>
-            <a:pPr lvl="2"/>
-            <a:r>
-              <a:rPr lang="en-US" dirty="0"/>
-              <a:t>Compare Sensitivity Assignment, allow no deviance</a:t>
-            </a:r>
-          </a:p>
-          <a:p>
-            <a:pPr lvl="2"/>
-            <a:endParaRPr lang="en-US" dirty="0"/>
-          </a:p>
-          <a:p>
-            <a:r>
-              <a:rPr lang="en-US" b="1" dirty="0"/>
-              <a:t>Travis.CI</a:t>
-            </a:r>
-            <a:r>
-              <a:rPr lang="en-US" dirty="0"/>
-              <a:t>, commit triggered &amp; cloud hosted build testing. </a:t>
-            </a:r>
-          </a:p>
-        </p:txBody>
-      </p:sp>
-    </p:spTree>
-    <p:extLst>
-      <p:ext uri="{BB962C8B-B14F-4D97-AF65-F5344CB8AC3E}">
-        <p14:creationId xmlns:p14="http://schemas.microsoft.com/office/powerpoint/2010/main" val="3396710390"/>
-      </p:ext>
-    </p:extLst>
-  </p:cSld>
-  <p:clrMapOvr>
-    <a:masterClrMapping/>
-  </p:clrMapOvr>
-</p:sld>
-</file>
-
-<file path=ppt/slides/slide11.xml><?xml version="1.0" encoding="utf-8"?>
-<p:sld xmlns:a="http://schemas.openxmlformats.org/drawingml/2006/main" xmlns:r="http://schemas.openxmlformats.org/officeDocument/2006/relationships" xmlns:p="http://schemas.openxmlformats.org/presentationml/2006/main">
-  <p:cSld>
-    <p:spTree>
-      <p:nvGrpSpPr>
-        <p:cNvPr id="1" name=""/>
-        <p:cNvGrpSpPr/>
-        <p:nvPr/>
-      </p:nvGrpSpPr>
-      <p:grpSpPr>
-        <a:xfrm>
-          <a:off x="0" y="0"/>
-          <a:ext cx="0" cy="0"/>
-          <a:chOff x="0" y="0"/>
-          <a:chExt cx="0" cy="0"/>
-        </a:xfrm>
-      </p:grpSpPr>
-      <p:sp>
-        <p:nvSpPr>
-          <p:cNvPr id="2" name="Title 1">
-            <a:extLst>
-              <a:ext uri="{FF2B5EF4-FFF2-40B4-BE49-F238E27FC236}">
-                <a16:creationId xmlns:a16="http://schemas.microsoft.com/office/drawing/2014/main" id="{C3E23411-9DEB-44BA-A868-D15684B128C3}"/>
-              </a:ext>
-            </a:extLst>
-          </p:cNvPr>
-          <p:cNvSpPr>
-            <a:spLocks noGrp="1"/>
-          </p:cNvSpPr>
-          <p:nvPr>
-            <p:ph type="title"/>
-          </p:nvPr>
-        </p:nvSpPr>
-        <p:spPr/>
-        <p:txBody>
-          <a:bodyPr/>
-          <a:lstStyle/>
-          <a:p>
-            <a:r>
-              <a:rPr lang="en-US" dirty="0"/>
-              <a:t>Pipeline Validation (power analysis)</a:t>
-            </a:r>
-          </a:p>
-        </p:txBody>
-      </p:sp>
-      <p:sp>
-        <p:nvSpPr>
-          <p:cNvPr id="3" name="Content Placeholder 2">
-            <a:extLst>
-              <a:ext uri="{FF2B5EF4-FFF2-40B4-BE49-F238E27FC236}">
-                <a16:creationId xmlns:a16="http://schemas.microsoft.com/office/drawing/2014/main" id="{4922B9ED-DDE8-4E5F-A9B6-33046050B172}"/>
-              </a:ext>
-            </a:extLst>
-          </p:cNvPr>
-          <p:cNvSpPr>
-            <a:spLocks noGrp="1"/>
-          </p:cNvSpPr>
-          <p:nvPr>
-            <p:ph idx="1"/>
-          </p:nvPr>
-        </p:nvSpPr>
-        <p:spPr>
-          <a:xfrm>
-            <a:off x="838199" y="1825625"/>
-            <a:ext cx="10644052" cy="4351338"/>
-          </a:xfrm>
-        </p:spPr>
-        <p:txBody>
-          <a:bodyPr/>
-          <a:lstStyle/>
-          <a:p>
-            <a:r>
-              <a:rPr lang="en-US" dirty="0"/>
-              <a:t>Simulate data using `</a:t>
-            </a:r>
-            <a:r>
-              <a:rPr lang="en-US" dirty="0" err="1"/>
-              <a:t>synthetic_doseresponse_generator</a:t>
-            </a:r>
-            <a:r>
-              <a:rPr lang="en-US" dirty="0"/>
-              <a:t>` output.  </a:t>
-            </a:r>
-            <a:r>
-              <a:rPr lang="en-US" sz="1800" dirty="0"/>
-              <a:t>(</a:t>
-            </a:r>
-            <a:r>
-              <a:rPr lang="en-US" sz="1800" dirty="0">
-                <a:hlinkClick r:id="rId2"/>
-              </a:rPr>
-              <a:t>https://github.com/nathanieljevans/synthetic_doseresponse_generator</a:t>
-            </a:r>
-            <a:r>
-              <a:rPr lang="en-US" sz="1800" dirty="0"/>
-              <a:t>) </a:t>
-            </a:r>
-          </a:p>
-          <a:p>
-            <a:r>
-              <a:rPr lang="en-US" dirty="0"/>
-              <a:t>Compare HNSCC-pipeline AUC to synthetic AUC and vary noise/replicates</a:t>
-            </a:r>
-          </a:p>
-        </p:txBody>
-      </p:sp>
-      <p:pic>
-        <p:nvPicPr>
-          <p:cNvPr id="6" name="Picture 5">
-            <a:extLst>
-              <a:ext uri="{FF2B5EF4-FFF2-40B4-BE49-F238E27FC236}">
-                <a16:creationId xmlns:a16="http://schemas.microsoft.com/office/drawing/2014/main" id="{F2906CE9-2C81-4BFA-9F8F-4BB2BAC85A57}"/>
-              </a:ext>
-            </a:extLst>
-          </p:cNvPr>
-          <p:cNvPicPr>
-            <a:picLocks noChangeAspect="1"/>
-          </p:cNvPicPr>
-          <p:nvPr/>
-        </p:nvPicPr>
-        <p:blipFill>
-          <a:blip r:embed="rId3"/>
-          <a:stretch>
-            <a:fillRect/>
-          </a:stretch>
-        </p:blipFill>
-        <p:spPr>
-          <a:xfrm>
-            <a:off x="1005840" y="3668240"/>
-            <a:ext cx="3029993" cy="2824635"/>
-          </a:xfrm>
-          <a:prstGeom prst="rect">
-            <a:avLst/>
-          </a:prstGeom>
-        </p:spPr>
-      </p:pic>
-      <p:pic>
-        <p:nvPicPr>
-          <p:cNvPr id="7" name="Picture 6">
-            <a:extLst>
-              <a:ext uri="{FF2B5EF4-FFF2-40B4-BE49-F238E27FC236}">
-                <a16:creationId xmlns:a16="http://schemas.microsoft.com/office/drawing/2014/main" id="{C1CAE2DF-0450-443F-BCC5-E7D838F7882A}"/>
-              </a:ext>
-            </a:extLst>
-          </p:cNvPr>
-          <p:cNvPicPr>
-            <a:picLocks noChangeAspect="1"/>
-          </p:cNvPicPr>
-          <p:nvPr/>
-        </p:nvPicPr>
-        <p:blipFill>
-          <a:blip r:embed="rId4"/>
-          <a:stretch>
-            <a:fillRect/>
-          </a:stretch>
-        </p:blipFill>
-        <p:spPr>
-          <a:xfrm>
-            <a:off x="5827578" y="3702362"/>
-            <a:ext cx="3198856" cy="2946631"/>
-          </a:xfrm>
-          <a:prstGeom prst="rect">
-            <a:avLst/>
-          </a:prstGeom>
-        </p:spPr>
-      </p:pic>
-    </p:spTree>
-    <p:extLst>
-      <p:ext uri="{BB962C8B-B14F-4D97-AF65-F5344CB8AC3E}">
-        <p14:creationId xmlns:p14="http://schemas.microsoft.com/office/powerpoint/2010/main" val="3586464873"/>
-      </p:ext>
-    </p:extLst>
-  </p:cSld>
-  <p:clrMapOvr>
-    <a:masterClrMapping/>
-  </p:clrMapOvr>
-</p:sld>
-</file>
-
-<file path=ppt/slides/slide12.xml><?xml version="1.0" encoding="utf-8"?>
-<p:sld xmlns:a="http://schemas.openxmlformats.org/drawingml/2006/main" xmlns:r="http://schemas.openxmlformats.org/officeDocument/2006/relationships" xmlns:p="http://schemas.openxmlformats.org/presentationml/2006/main">
-  <p:cSld>
-    <p:spTree>
-      <p:nvGrpSpPr>
-        <p:cNvPr id="1" name=""/>
-        <p:cNvGrpSpPr/>
-        <p:nvPr/>
-      </p:nvGrpSpPr>
-      <p:grpSpPr>
-        <a:xfrm>
-          <a:off x="0" y="0"/>
-          <a:ext cx="0" cy="0"/>
-          <a:chOff x="0" y="0"/>
-          <a:chExt cx="0" cy="0"/>
-        </a:xfrm>
-      </p:grpSpPr>
-      <p:sp>
-        <p:nvSpPr>
-          <p:cNvPr id="2" name="Title 1">
-            <a:extLst>
-              <a:ext uri="{FF2B5EF4-FFF2-40B4-BE49-F238E27FC236}">
                 <a16:creationId xmlns:a16="http://schemas.microsoft.com/office/drawing/2014/main" id="{EF3D8EA6-2A2D-4FF6-8155-46C4BDFB3ACE}"/>
               </a:ext>
             </a:extLst>
@@ -4474,7 +4140,7 @@
 </p:sld>
 </file>
 
-<file path=ppt/slides/slide13.xml><?xml version="1.0" encoding="utf-8"?>
+<file path=ppt/slides/slide11.xml><?xml version="1.0" encoding="utf-8"?>
 <p:sld xmlns:a="http://schemas.openxmlformats.org/drawingml/2006/main" xmlns:r="http://schemas.openxmlformats.org/officeDocument/2006/relationships" xmlns:p="http://schemas.openxmlformats.org/presentationml/2006/main">
   <p:cSld>
     <p:spTree>
@@ -4759,7 +4425,7 @@
 </p:sld>
 </file>
 
-<file path=ppt/slides/slide14.xml><?xml version="1.0" encoding="utf-8"?>
+<file path=ppt/slides/slide12.xml><?xml version="1.0" encoding="utf-8"?>
 <p:sld xmlns:a="http://schemas.openxmlformats.org/drawingml/2006/main" xmlns:r="http://schemas.openxmlformats.org/officeDocument/2006/relationships" xmlns:p="http://schemas.openxmlformats.org/presentationml/2006/main">
   <p:cSld>
     <p:spTree>
@@ -4903,7 +4569,7 @@
 </p:sld>
 </file>
 
-<file path=ppt/slides/slide15.xml><?xml version="1.0" encoding="utf-8"?>
+<file path=ppt/slides/slide13.xml><?xml version="1.0" encoding="utf-8"?>
 <p:sld xmlns:a="http://schemas.openxmlformats.org/drawingml/2006/main" xmlns:r="http://schemas.openxmlformats.org/officeDocument/2006/relationships" xmlns:p="http://schemas.openxmlformats.org/presentationml/2006/main">
   <p:cSld>
     <p:spTree>
@@ -5080,7 +4746,7 @@
 </p:sld>
 </file>
 
-<file path=ppt/slides/slide16.xml><?xml version="1.0" encoding="utf-8"?>
+<file path=ppt/slides/slide14.xml><?xml version="1.0" encoding="utf-8"?>
 <p:sld xmlns:a="http://schemas.openxmlformats.org/drawingml/2006/main" xmlns:r="http://schemas.openxmlformats.org/officeDocument/2006/relationships" xmlns:p="http://schemas.openxmlformats.org/presentationml/2006/main">
   <p:cSld>
     <p:spTree>
@@ -5120,7 +4786,7 @@
           <a:p>
             <a:r>
               <a:rPr lang="en-US" dirty="0"/>
-              <a:t>TODO</a:t>
+              <a:t>TODO &amp; Questions</a:t>
             </a:r>
           </a:p>
         </p:txBody>
@@ -5165,12 +4831,14 @@
           </a:p>
           <a:p>
             <a:r>
-              <a:rPr lang="en-US" dirty="0" err="1"/>
-              <a:t>Etc</a:t>
-            </a:r>
-            <a:r>
               <a:rPr lang="en-US" dirty="0"/>
-              <a:t> </a:t>
+              <a:t>Batch Effect Analysis </a:t>
+            </a:r>
+          </a:p>
+          <a:p>
+            <a:r>
+              <a:rPr lang="en-US" dirty="0"/>
+              <a:t>Report Requests? </a:t>
             </a:r>
           </a:p>
         </p:txBody>
@@ -5210,7 +4878,7 @@
           <p:cNvPr id="2" name="Title 1">
             <a:extLst>
               <a:ext uri="{FF2B5EF4-FFF2-40B4-BE49-F238E27FC236}">
-                <a16:creationId xmlns:a16="http://schemas.microsoft.com/office/drawing/2014/main" id="{0C9934DF-8684-482D-A4AA-A6412C0D074C}"/>
+                <a16:creationId xmlns:a16="http://schemas.microsoft.com/office/drawing/2014/main" id="{C0AC5766-9107-45C7-B7B3-97E1445E71BC}"/>
               </a:ext>
             </a:extLst>
           </p:cNvPr>
@@ -5228,17 +4896,17 @@
           <a:p>
             <a:r>
               <a:rPr lang="en-US" dirty="0"/>
-              <a:t>Overview </a:t>
-            </a:r>
-          </a:p>
-        </p:txBody>
-      </p:sp>
-      <p:sp>
-        <p:nvSpPr>
-          <p:cNvPr id="3" name="Content Placeholder 2">
-            <a:extLst>
-              <a:ext uri="{FF2B5EF4-FFF2-40B4-BE49-F238E27FC236}">
-                <a16:creationId xmlns:a16="http://schemas.microsoft.com/office/drawing/2014/main" id="{D14D1252-27F6-45E4-AC18-DBBDBC8B95FE}"/>
+              <a:t>Panel Assay Data Naming Convention</a:t>
+            </a:r>
+          </a:p>
+        </p:txBody>
+      </p:sp>
+      <p:sp>
+        <p:nvSpPr>
+          <p:cNvPr id="5" name="Content Placeholder 4">
+            <a:extLst>
+              <a:ext uri="{FF2B5EF4-FFF2-40B4-BE49-F238E27FC236}">
+                <a16:creationId xmlns:a16="http://schemas.microsoft.com/office/drawing/2014/main" id="{0BF8B9F1-1AD4-4586-8AB8-F335806247CB}"/>
               </a:ext>
             </a:extLst>
           </p:cNvPr>
@@ -5249,7 +4917,12 @@
             <p:ph idx="1"/>
           </p:nvPr>
         </p:nvSpPr>
-        <p:spPr/>
+        <p:spPr>
+          <a:xfrm>
+            <a:off x="838200" y="2560321"/>
+            <a:ext cx="10515600" cy="3259320"/>
+          </a:xfrm>
+        </p:spPr>
         <p:txBody>
           <a:bodyPr>
             <a:normAutofit/>
@@ -5258,570 +4931,38 @@
           <a:p>
             <a:r>
               <a:rPr lang="en-US" dirty="0"/>
-              <a:t>Number of HNSCC patients:  11 HNSCC patients, 21 Panels</a:t>
+              <a:t>Currently, renamed data is only stored locally. I’ll add a box folder in the future. </a:t>
             </a:r>
           </a:p>
           <a:p>
             <a:r>
               <a:rPr lang="en-US" dirty="0"/>
-              <a:t>Plate map versions </a:t>
-            </a:r>
-          </a:p>
-          <a:p>
-            <a:pPr lvl="1"/>
+              <a:t>Deviation from the naming convention will result in failed processing. </a:t>
+            </a:r>
+          </a:p>
+          <a:p>
             <a:r>
               <a:rPr lang="en-US" dirty="0"/>
-              <a:t>Plates 1-3 (rev 001)</a:t>
-            </a:r>
-          </a:p>
-          <a:p>
-            <a:pPr lvl="1"/>
-            <a:r>
-              <a:rPr lang="en-US" dirty="0"/>
-              <a:t>Plates 1-6 (rev 002) [combination plates: 3-6]</a:t>
-            </a:r>
-          </a:p>
-          <a:p>
-            <a:pPr lvl="1"/>
-            <a:r>
-              <a:rPr lang="en-US" dirty="0"/>
-              <a:t>Tyner panels – still need to be re-worked into HNSCC-format plate map’s. </a:t>
-            </a:r>
-          </a:p>
-          <a:p>
-            <a:pPr lvl="1"/>
-            <a:r>
-              <a:rPr lang="en-US" dirty="0"/>
-              <a:t>There is one Panel with 7 plates (10356; Issue #6) which will require a unique plate-map. </a:t>
-            </a:r>
-          </a:p>
-          <a:p>
-            <a:pPr lvl="1"/>
-            <a:r>
-              <a:rPr lang="en-US" dirty="0"/>
-              <a:t>Excel files with pages: meta, concentration_&lt;num&gt;, inhibitor_&lt;num&gt;</a:t>
-            </a:r>
-          </a:p>
-          <a:p>
-            <a:pPr lvl="1"/>
-            <a:r>
-              <a:rPr lang="en-US" dirty="0"/>
-              <a:t>Plate map REV002 drug names need to be re-done (Issue #8) </a:t>
-            </a:r>
-          </a:p>
-          <a:p>
-            <a:pPr lvl="1"/>
-            <a:endParaRPr lang="en-US" dirty="0"/>
-          </a:p>
-        </p:txBody>
-      </p:sp>
-    </p:spTree>
-    <p:extLst>
-      <p:ext uri="{BB962C8B-B14F-4D97-AF65-F5344CB8AC3E}">
-        <p14:creationId xmlns:p14="http://schemas.microsoft.com/office/powerpoint/2010/main" val="3771634021"/>
-      </p:ext>
-    </p:extLst>
-  </p:cSld>
-  <p:clrMapOvr>
-    <a:masterClrMapping/>
-  </p:clrMapOvr>
-</p:sld>
-</file>
-
-<file path=ppt/slides/slide3.xml><?xml version="1.0" encoding="utf-8"?>
-<p:sld xmlns:a="http://schemas.openxmlformats.org/drawingml/2006/main" xmlns:r="http://schemas.openxmlformats.org/officeDocument/2006/relationships" xmlns:p="http://schemas.openxmlformats.org/presentationml/2006/main">
-  <p:cSld>
-    <p:spTree>
-      <p:nvGrpSpPr>
-        <p:cNvPr id="1" name=""/>
-        <p:cNvGrpSpPr/>
-        <p:nvPr/>
-      </p:nvGrpSpPr>
-      <p:grpSpPr>
-        <a:xfrm>
-          <a:off x="0" y="0"/>
-          <a:ext cx="0" cy="0"/>
-          <a:chOff x="0" y="0"/>
-          <a:chExt cx="0" cy="0"/>
-        </a:xfrm>
-      </p:grpSpPr>
-      <p:sp>
-        <p:nvSpPr>
-          <p:cNvPr id="2" name="Title 1">
-            <a:extLst>
-              <a:ext uri="{FF2B5EF4-FFF2-40B4-BE49-F238E27FC236}">
-                <a16:creationId xmlns:a16="http://schemas.microsoft.com/office/drawing/2014/main" id="{8D809C78-8E66-43AA-9B99-AA5190CEB180}"/>
-              </a:ext>
-            </a:extLst>
-          </p:cNvPr>
-          <p:cNvSpPr>
-            <a:spLocks noGrp="1"/>
-          </p:cNvSpPr>
-          <p:nvPr>
-            <p:ph type="title"/>
-          </p:nvPr>
-        </p:nvSpPr>
-        <p:spPr/>
-        <p:txBody>
-          <a:bodyPr/>
-          <a:lstStyle/>
-          <a:p>
-            <a:r>
-              <a:rPr lang="en-US" dirty="0"/>
-              <a:t>Plate-Map Format</a:t>
-            </a:r>
-          </a:p>
-        </p:txBody>
-      </p:sp>
-      <p:pic>
-        <p:nvPicPr>
-          <p:cNvPr id="6" name="Picture 5">
-            <a:extLst>
-              <a:ext uri="{FF2B5EF4-FFF2-40B4-BE49-F238E27FC236}">
-                <a16:creationId xmlns:a16="http://schemas.microsoft.com/office/drawing/2014/main" id="{5D52AD6C-389D-44B8-BA09-50CD6773D647}"/>
-              </a:ext>
-            </a:extLst>
-          </p:cNvPr>
-          <p:cNvPicPr>
-            <a:picLocks noChangeAspect="1"/>
-          </p:cNvPicPr>
+              <a:t>HNSCC-Format Plate Maps; Each panel has meta data page and a inhibitor-name, inhibitor-concentration page for each plate. </a:t>
+            </a:r>
+          </a:p>
+        </p:txBody>
+      </p:sp>
+      <p:sp>
+        <p:nvSpPr>
+          <p:cNvPr id="6" name="Rectangle 5">
+            <a:extLst>
+              <a:ext uri="{FF2B5EF4-FFF2-40B4-BE49-F238E27FC236}">
+                <a16:creationId xmlns:a16="http://schemas.microsoft.com/office/drawing/2014/main" id="{7DC8EA49-C30B-41D9-B6BE-A5816DA9BE98}"/>
+              </a:ext>
+            </a:extLst>
+          </p:cNvPr>
+          <p:cNvSpPr/>
           <p:nvPr/>
-        </p:nvPicPr>
-        <p:blipFill>
-          <a:blip r:embed="rId2"/>
-          <a:stretch>
-            <a:fillRect/>
-          </a:stretch>
-        </p:blipFill>
+        </p:nvSpPr>
         <p:spPr>
           <a:xfrm>
-            <a:off x="1021080" y="1960124"/>
-            <a:ext cx="9899815" cy="3484735"/>
-          </a:xfrm>
-          <a:prstGeom prst="rect">
-            <a:avLst/>
-          </a:prstGeom>
-        </p:spPr>
-      </p:pic>
-      <p:pic>
-        <p:nvPicPr>
-          <p:cNvPr id="4" name="Picture 3">
-            <a:extLst>
-              <a:ext uri="{FF2B5EF4-FFF2-40B4-BE49-F238E27FC236}">
-                <a16:creationId xmlns:a16="http://schemas.microsoft.com/office/drawing/2014/main" id="{9D59466A-9DD4-455B-AB8E-E26AEBFEA4A6}"/>
-              </a:ext>
-            </a:extLst>
-          </p:cNvPr>
-          <p:cNvPicPr>
-            <a:picLocks noChangeAspect="1"/>
-          </p:cNvPicPr>
-          <p:nvPr/>
-        </p:nvPicPr>
-        <p:blipFill>
-          <a:blip r:embed="rId3"/>
-          <a:stretch>
-            <a:fillRect/>
-          </a:stretch>
-        </p:blipFill>
-        <p:spPr>
-          <a:xfrm>
-            <a:off x="2459083" y="1960124"/>
-            <a:ext cx="7273834" cy="4339964"/>
-          </a:xfrm>
-          <a:prstGeom prst="rect">
-            <a:avLst/>
-          </a:prstGeom>
-        </p:spPr>
-      </p:pic>
-      <p:pic>
-        <p:nvPicPr>
-          <p:cNvPr id="5" name="Picture 4">
-            <a:extLst>
-              <a:ext uri="{FF2B5EF4-FFF2-40B4-BE49-F238E27FC236}">
-                <a16:creationId xmlns:a16="http://schemas.microsoft.com/office/drawing/2014/main" id="{9A32E1AB-5341-4611-9F6D-69C5C2532CFA}"/>
-              </a:ext>
-            </a:extLst>
-          </p:cNvPr>
-          <p:cNvPicPr>
-            <a:picLocks noChangeAspect="1"/>
-          </p:cNvPicPr>
-          <p:nvPr/>
-        </p:nvPicPr>
-        <p:blipFill>
-          <a:blip r:embed="rId4"/>
-          <a:stretch>
-            <a:fillRect/>
-          </a:stretch>
-        </p:blipFill>
-        <p:spPr>
-          <a:xfrm>
-            <a:off x="1021080" y="1960124"/>
-            <a:ext cx="9897580" cy="2037110"/>
-          </a:xfrm>
-          <a:prstGeom prst="rect">
-            <a:avLst/>
-          </a:prstGeom>
-        </p:spPr>
-      </p:pic>
-    </p:spTree>
-    <p:extLst>
-      <p:ext uri="{BB962C8B-B14F-4D97-AF65-F5344CB8AC3E}">
-        <p14:creationId xmlns:p14="http://schemas.microsoft.com/office/powerpoint/2010/main" val="3301576432"/>
-      </p:ext>
-    </p:extLst>
-  </p:cSld>
-  <p:clrMapOvr>
-    <a:masterClrMapping/>
-  </p:clrMapOvr>
-  <p:timing>
-    <p:tnLst>
-      <p:par>
-        <p:cTn id="1" dur="indefinite" restart="never" nodeType="tmRoot">
-          <p:childTnLst>
-            <p:seq concurrent="1" nextAc="seek">
-              <p:cTn id="2" dur="indefinite" nodeType="mainSeq">
-                <p:childTnLst>
-                  <p:par>
-                    <p:cTn id="3" fill="hold">
-                      <p:stCondLst>
-                        <p:cond delay="indefinite"/>
-                      </p:stCondLst>
-                      <p:childTnLst>
-                        <p:par>
-                          <p:cTn id="4" fill="hold">
-                            <p:stCondLst>
-                              <p:cond delay="0"/>
-                            </p:stCondLst>
-                            <p:childTnLst>
-                              <p:par>
-                                <p:cTn id="5" presetID="10" presetClass="exit" presetSubtype="0" fill="hold" nodeType="clickEffect">
-                                  <p:stCondLst>
-                                    <p:cond delay="0"/>
-                                  </p:stCondLst>
-                                  <p:childTnLst>
-                                    <p:animEffect transition="out" filter="fade">
-                                      <p:cBhvr>
-                                        <p:cTn id="6" dur="500"/>
-                                        <p:tgtEl>
-                                          <p:spTgt spid="6"/>
-                                        </p:tgtEl>
-                                      </p:cBhvr>
-                                    </p:animEffect>
-                                    <p:set>
-                                      <p:cBhvr>
-                                        <p:cTn id="7" dur="1" fill="hold">
-                                          <p:stCondLst>
-                                            <p:cond delay="499"/>
-                                          </p:stCondLst>
-                                        </p:cTn>
-                                        <p:tgtEl>
-                                          <p:spTgt spid="6"/>
-                                        </p:tgtEl>
-                                        <p:attrNameLst>
-                                          <p:attrName>style.visibility</p:attrName>
-                                        </p:attrNameLst>
-                                      </p:cBhvr>
-                                      <p:to>
-                                        <p:strVal val="hidden"/>
-                                      </p:to>
-                                    </p:set>
-                                  </p:childTnLst>
-                                </p:cTn>
-                              </p:par>
-                              <p:par>
-                                <p:cTn id="8" presetID="10" presetClass="entr" presetSubtype="0" fill="hold" nodeType="withEffect">
-                                  <p:stCondLst>
-                                    <p:cond delay="0"/>
-                                  </p:stCondLst>
-                                  <p:childTnLst>
-                                    <p:set>
-                                      <p:cBhvr>
-                                        <p:cTn id="9" dur="1" fill="hold">
-                                          <p:stCondLst>
-                                            <p:cond delay="0"/>
-                                          </p:stCondLst>
-                                        </p:cTn>
-                                        <p:tgtEl>
-                                          <p:spTgt spid="4"/>
-                                        </p:tgtEl>
-                                        <p:attrNameLst>
-                                          <p:attrName>style.visibility</p:attrName>
-                                        </p:attrNameLst>
-                                      </p:cBhvr>
-                                      <p:to>
-                                        <p:strVal val="visible"/>
-                                      </p:to>
-                                    </p:set>
-                                    <p:animEffect transition="in" filter="fade">
-                                      <p:cBhvr>
-                                        <p:cTn id="10" dur="500"/>
-                                        <p:tgtEl>
-                                          <p:spTgt spid="4"/>
-                                        </p:tgtEl>
-                                      </p:cBhvr>
-                                    </p:animEffect>
-                                  </p:childTnLst>
-                                </p:cTn>
-                              </p:par>
-                            </p:childTnLst>
-                          </p:cTn>
-                        </p:par>
-                      </p:childTnLst>
-                    </p:cTn>
-                  </p:par>
-                  <p:par>
-                    <p:cTn id="11" fill="hold">
-                      <p:stCondLst>
-                        <p:cond delay="indefinite"/>
-                      </p:stCondLst>
-                      <p:childTnLst>
-                        <p:par>
-                          <p:cTn id="12" fill="hold">
-                            <p:stCondLst>
-                              <p:cond delay="0"/>
-                            </p:stCondLst>
-                            <p:childTnLst>
-                              <p:par>
-                                <p:cTn id="13" presetID="10" presetClass="exit" presetSubtype="0" fill="hold" nodeType="clickEffect">
-                                  <p:stCondLst>
-                                    <p:cond delay="0"/>
-                                  </p:stCondLst>
-                                  <p:childTnLst>
-                                    <p:animEffect transition="out" filter="fade">
-                                      <p:cBhvr>
-                                        <p:cTn id="14" dur="500"/>
-                                        <p:tgtEl>
-                                          <p:spTgt spid="4"/>
-                                        </p:tgtEl>
-                                      </p:cBhvr>
-                                    </p:animEffect>
-                                    <p:set>
-                                      <p:cBhvr>
-                                        <p:cTn id="15" dur="1" fill="hold">
-                                          <p:stCondLst>
-                                            <p:cond delay="499"/>
-                                          </p:stCondLst>
-                                        </p:cTn>
-                                        <p:tgtEl>
-                                          <p:spTgt spid="4"/>
-                                        </p:tgtEl>
-                                        <p:attrNameLst>
-                                          <p:attrName>style.visibility</p:attrName>
-                                        </p:attrNameLst>
-                                      </p:cBhvr>
-                                      <p:to>
-                                        <p:strVal val="hidden"/>
-                                      </p:to>
-                                    </p:set>
-                                  </p:childTnLst>
-                                </p:cTn>
-                              </p:par>
-                              <p:par>
-                                <p:cTn id="16" presetID="10" presetClass="entr" presetSubtype="0" fill="hold" nodeType="withEffect">
-                                  <p:stCondLst>
-                                    <p:cond delay="0"/>
-                                  </p:stCondLst>
-                                  <p:childTnLst>
-                                    <p:set>
-                                      <p:cBhvr>
-                                        <p:cTn id="17" dur="1" fill="hold">
-                                          <p:stCondLst>
-                                            <p:cond delay="0"/>
-                                          </p:stCondLst>
-                                        </p:cTn>
-                                        <p:tgtEl>
-                                          <p:spTgt spid="5"/>
-                                        </p:tgtEl>
-                                        <p:attrNameLst>
-                                          <p:attrName>style.visibility</p:attrName>
-                                        </p:attrNameLst>
-                                      </p:cBhvr>
-                                      <p:to>
-                                        <p:strVal val="visible"/>
-                                      </p:to>
-                                    </p:set>
-                                    <p:animEffect transition="in" filter="fade">
-                                      <p:cBhvr>
-                                        <p:cTn id="18" dur="500"/>
-                                        <p:tgtEl>
-                                          <p:spTgt spid="5"/>
-                                        </p:tgtEl>
-                                      </p:cBhvr>
-                                    </p:animEffect>
-                                  </p:childTnLst>
-                                </p:cTn>
-                              </p:par>
-                            </p:childTnLst>
-                          </p:cTn>
-                        </p:par>
-                      </p:childTnLst>
-                    </p:cTn>
-                  </p:par>
-                </p:childTnLst>
-              </p:cTn>
-              <p:prevCondLst>
-                <p:cond evt="onPrev" delay="0">
-                  <p:tgtEl>
-                    <p:sldTgt/>
-                  </p:tgtEl>
-                </p:cond>
-              </p:prevCondLst>
-              <p:nextCondLst>
-                <p:cond evt="onNext" delay="0">
-                  <p:tgtEl>
-                    <p:sldTgt/>
-                  </p:tgtEl>
-                </p:cond>
-              </p:nextCondLst>
-            </p:seq>
-          </p:childTnLst>
-        </p:cTn>
-      </p:par>
-    </p:tnLst>
-  </p:timing>
-</p:sld>
-</file>
-
-<file path=ppt/slides/slide4.xml><?xml version="1.0" encoding="utf-8"?>
-<p:sld xmlns:a="http://schemas.openxmlformats.org/drawingml/2006/main" xmlns:r="http://schemas.openxmlformats.org/officeDocument/2006/relationships" xmlns:p="http://schemas.openxmlformats.org/presentationml/2006/main">
-  <p:cSld>
-    <p:spTree>
-      <p:nvGrpSpPr>
-        <p:cNvPr id="1" name=""/>
-        <p:cNvGrpSpPr/>
-        <p:nvPr/>
-      </p:nvGrpSpPr>
-      <p:grpSpPr>
-        <a:xfrm>
-          <a:off x="0" y="0"/>
-          <a:ext cx="0" cy="0"/>
-          <a:chOff x="0" y="0"/>
-          <a:chExt cx="0" cy="0"/>
-        </a:xfrm>
-      </p:grpSpPr>
-      <p:sp>
-        <p:nvSpPr>
-          <p:cNvPr id="2" name="Title 1">
-            <a:extLst>
-              <a:ext uri="{FF2B5EF4-FFF2-40B4-BE49-F238E27FC236}">
-                <a16:creationId xmlns:a16="http://schemas.microsoft.com/office/drawing/2014/main" id="{C0AC5766-9107-45C7-B7B3-97E1445E71BC}"/>
-              </a:ext>
-            </a:extLst>
-          </p:cNvPr>
-          <p:cNvSpPr>
-            <a:spLocks noGrp="1"/>
-          </p:cNvSpPr>
-          <p:nvPr>
-            <p:ph type="title"/>
-          </p:nvPr>
-        </p:nvSpPr>
-        <p:spPr/>
-        <p:txBody>
-          <a:bodyPr/>
-          <a:lstStyle/>
-          <a:p>
-            <a:r>
-              <a:rPr lang="en-US" dirty="0"/>
-              <a:t>Panel Assay Data Naming Convention</a:t>
-            </a:r>
-          </a:p>
-        </p:txBody>
-      </p:sp>
-      <p:sp>
-        <p:nvSpPr>
-          <p:cNvPr id="5" name="Content Placeholder 4">
-            <a:extLst>
-              <a:ext uri="{FF2B5EF4-FFF2-40B4-BE49-F238E27FC236}">
-                <a16:creationId xmlns:a16="http://schemas.microsoft.com/office/drawing/2014/main" id="{0BF8B9F1-1AD4-4586-8AB8-F335806247CB}"/>
-              </a:ext>
-            </a:extLst>
-          </p:cNvPr>
-          <p:cNvSpPr>
-            <a:spLocks noGrp="1"/>
-          </p:cNvSpPr>
-          <p:nvPr>
-            <p:ph idx="1"/>
-          </p:nvPr>
-        </p:nvSpPr>
-        <p:spPr>
-          <a:xfrm>
-            <a:off x="838200" y="2630579"/>
-            <a:ext cx="10515600" cy="2863941"/>
-          </a:xfrm>
-        </p:spPr>
-        <p:txBody>
-          <a:bodyPr>
-            <a:normAutofit fontScale="85000" lnSpcReduction="10000"/>
-          </a:bodyPr>
-          <a:lstStyle/>
-          <a:p>
-            <a:endParaRPr lang="en-US" dirty="0"/>
-          </a:p>
-          <a:p>
-            <a:endParaRPr lang="en-US" dirty="0"/>
-          </a:p>
-          <a:p>
-            <a:endParaRPr lang="en-US" dirty="0"/>
-          </a:p>
-          <a:p>
-            <a:r>
-              <a:rPr lang="en-US" dirty="0"/>
-              <a:t>When each panel assay is processed, a </a:t>
-            </a:r>
-            <a:r>
-              <a:rPr lang="en-US" b="1" i="1" dirty="0" err="1"/>
-              <a:t>panel_id</a:t>
-            </a:r>
-            <a:r>
-              <a:rPr lang="en-US" i="1" dirty="0"/>
-              <a:t> </a:t>
-            </a:r>
-            <a:r>
-              <a:rPr lang="en-US" dirty="0"/>
-              <a:t>is assigned to distinguish between across-panel replicates (recorded in </a:t>
-            </a:r>
-            <a:r>
-              <a:rPr lang="en-US" i="1" dirty="0"/>
-              <a:t>.</a:t>
-            </a:r>
-            <a:r>
-              <a:rPr lang="en-US" i="1" dirty="0" err="1"/>
-              <a:t>assay_ids</a:t>
-            </a:r>
-            <a:r>
-              <a:rPr lang="en-US" dirty="0"/>
-              <a:t>)</a:t>
-            </a:r>
-          </a:p>
-          <a:p>
-            <a:r>
-              <a:rPr lang="en-US" dirty="0"/>
-              <a:t>Currently, renamed data is only stored locally. I’ll add a box folder in the future. </a:t>
-            </a:r>
-          </a:p>
-          <a:p>
-            <a:r>
-              <a:rPr lang="en-US" dirty="0"/>
-              <a:t>Deviation from the naming convention will result in failed processing. </a:t>
-            </a:r>
-          </a:p>
-        </p:txBody>
-      </p:sp>
-      <p:sp>
-        <p:nvSpPr>
-          <p:cNvPr id="6" name="Rectangle 5">
-            <a:extLst>
-              <a:ext uri="{FF2B5EF4-FFF2-40B4-BE49-F238E27FC236}">
-                <a16:creationId xmlns:a16="http://schemas.microsoft.com/office/drawing/2014/main" id="{7DC8EA49-C30B-41D9-B6BE-A5816DA9BE98}"/>
-              </a:ext>
-            </a:extLst>
-          </p:cNvPr>
-          <p:cNvSpPr/>
-          <p:nvPr/>
-        </p:nvSpPr>
-        <p:spPr>
-          <a:xfrm>
-            <a:off x="590005" y="2226265"/>
+            <a:off x="590005" y="1690688"/>
             <a:ext cx="11011989" cy="569186"/>
           </a:xfrm>
           <a:prstGeom prst="rect">
@@ -5921,7 +5062,7 @@
 </p:sld>
 </file>
 
-<file path=ppt/slides/slide5.xml><?xml version="1.0" encoding="utf-8"?>
+<file path=ppt/slides/slide3.xml><?xml version="1.0" encoding="utf-8"?>
 <p:sld xmlns:a="http://schemas.openxmlformats.org/drawingml/2006/main" xmlns:r="http://schemas.openxmlformats.org/officeDocument/2006/relationships" xmlns:p="http://schemas.openxmlformats.org/presentationml/2006/main">
   <p:cSld>
     <p:spTree>
@@ -9761,7 +8902,7 @@
 </p:sld>
 </file>
 
-<file path=ppt/slides/slide6.xml><?xml version="1.0" encoding="utf-8"?>
+<file path=ppt/slides/slide4.xml><?xml version="1.0" encoding="utf-8"?>
 <p:sld xmlns:a="http://schemas.openxmlformats.org/drawingml/2006/main" xmlns:r="http://schemas.openxmlformats.org/officeDocument/2006/relationships" xmlns:p="http://schemas.openxmlformats.org/presentationml/2006/main">
   <p:cSld>
     <p:spTree>
@@ -13412,7 +12553,7 @@
 </p:sld>
 </file>
 
-<file path=ppt/slides/slide7.xml><?xml version="1.0" encoding="utf-8"?>
+<file path=ppt/slides/slide5.xml><?xml version="1.0" encoding="utf-8"?>
 <p:sld xmlns:a="http://schemas.openxmlformats.org/drawingml/2006/main" xmlns:r="http://schemas.openxmlformats.org/officeDocument/2006/relationships" xmlns:p="http://schemas.openxmlformats.org/presentationml/2006/main">
   <p:cSld>
     <p:spTree>
@@ -15201,7 +14342,7 @@
 </p:sld>
 </file>
 
-<file path=ppt/slides/slide8.xml><?xml version="1.0" encoding="utf-8"?>
+<file path=ppt/slides/slide6.xml><?xml version="1.0" encoding="utf-8"?>
 <p:sld xmlns:a="http://schemas.openxmlformats.org/drawingml/2006/main" xmlns:r="http://schemas.openxmlformats.org/officeDocument/2006/relationships" xmlns:p="http://schemas.openxmlformats.org/presentationml/2006/main">
   <p:cSld>
     <p:spTree>
@@ -15323,6 +14464,301 @@
 </p:sld>
 </file>
 
+<file path=ppt/slides/slide7.xml><?xml version="1.0" encoding="utf-8"?>
+<p:sld xmlns:a="http://schemas.openxmlformats.org/drawingml/2006/main" xmlns:r="http://schemas.openxmlformats.org/officeDocument/2006/relationships" xmlns:p="http://schemas.openxmlformats.org/presentationml/2006/main">
+  <p:cSld>
+    <p:spTree>
+      <p:nvGrpSpPr>
+        <p:cNvPr id="1" name=""/>
+        <p:cNvGrpSpPr/>
+        <p:nvPr/>
+      </p:nvGrpSpPr>
+      <p:grpSpPr>
+        <a:xfrm>
+          <a:off x="0" y="0"/>
+          <a:ext cx="0" cy="0"/>
+          <a:chOff x="0" y="0"/>
+          <a:chExt cx="0" cy="0"/>
+        </a:xfrm>
+      </p:grpSpPr>
+      <p:sp>
+        <p:nvSpPr>
+          <p:cNvPr id="2" name="Title 1">
+            <a:extLst>
+              <a:ext uri="{FF2B5EF4-FFF2-40B4-BE49-F238E27FC236}">
+                <a16:creationId xmlns:a16="http://schemas.microsoft.com/office/drawing/2014/main" id="{95F4178F-5881-4F84-83BA-DA9F13D48F50}"/>
+              </a:ext>
+            </a:extLst>
+          </p:cNvPr>
+          <p:cNvSpPr>
+            <a:spLocks noGrp="1"/>
+          </p:cNvSpPr>
+          <p:nvPr>
+            <p:ph type="title"/>
+          </p:nvPr>
+        </p:nvSpPr>
+        <p:spPr/>
+        <p:txBody>
+          <a:bodyPr/>
+          <a:lstStyle/>
+          <a:p>
+            <a:r>
+              <a:rPr lang="en-US" dirty="0"/>
+              <a:t>Documentation</a:t>
+            </a:r>
+          </a:p>
+        </p:txBody>
+      </p:sp>
+      <p:sp>
+        <p:nvSpPr>
+          <p:cNvPr id="3" name="Content Placeholder 2">
+            <a:extLst>
+              <a:ext uri="{FF2B5EF4-FFF2-40B4-BE49-F238E27FC236}">
+                <a16:creationId xmlns:a16="http://schemas.microsoft.com/office/drawing/2014/main" id="{10119908-95F5-4256-80FB-49412F64EF4D}"/>
+              </a:ext>
+            </a:extLst>
+          </p:cNvPr>
+          <p:cNvSpPr>
+            <a:spLocks noGrp="1"/>
+          </p:cNvSpPr>
+          <p:nvPr>
+            <p:ph idx="1"/>
+          </p:nvPr>
+        </p:nvSpPr>
+        <p:spPr/>
+        <p:txBody>
+          <a:bodyPr/>
+          <a:lstStyle/>
+          <a:p>
+            <a:r>
+              <a:rPr lang="en-US" dirty="0"/>
+              <a:t>All code and documentation is stored in a private </a:t>
+            </a:r>
+            <a:r>
+              <a:rPr lang="en-US" dirty="0" err="1"/>
+              <a:t>github</a:t>
+            </a:r>
+            <a:r>
+              <a:rPr lang="en-US" dirty="0"/>
+              <a:t> repo. </a:t>
+            </a:r>
+            <a:r>
+              <a:rPr lang="en-US" sz="2000" dirty="0"/>
+              <a:t>(</a:t>
+            </a:r>
+            <a:r>
+              <a:rPr lang="en-US" sz="2000" dirty="0">
+                <a:hlinkClick r:id="rId2"/>
+              </a:rPr>
+              <a:t>https://github.com/nathanieljevans/HNSCC_functional_data_pipeline</a:t>
+            </a:r>
+            <a:r>
+              <a:rPr lang="en-US" sz="2000" dirty="0"/>
+              <a:t>) </a:t>
+            </a:r>
+          </a:p>
+          <a:p>
+            <a:r>
+              <a:rPr lang="en-US" dirty="0"/>
+              <a:t>Wiki Pages; Wet-lab protocols, </a:t>
+            </a:r>
+            <a:r>
+              <a:rPr lang="en-US" dirty="0" err="1"/>
+              <a:t>DR_ViewerApp_Tutorial</a:t>
+            </a:r>
+            <a:r>
+              <a:rPr lang="en-US" dirty="0"/>
+              <a:t>, etc. </a:t>
+            </a:r>
+          </a:p>
+          <a:p>
+            <a:r>
+              <a:rPr lang="en-US" dirty="0"/>
+              <a:t>Issues – Bug tracking, feature requests, </a:t>
+            </a:r>
+            <a:r>
+              <a:rPr lang="en-US" dirty="0" err="1"/>
+              <a:t>etc</a:t>
+            </a:r>
+            <a:endParaRPr lang="en-US" dirty="0"/>
+          </a:p>
+          <a:p>
+            <a:r>
+              <a:rPr lang="en-US" dirty="0"/>
+              <a:t>Data Dictionary </a:t>
+            </a:r>
+          </a:p>
+          <a:p>
+            <a:endParaRPr lang="en-US" dirty="0"/>
+          </a:p>
+        </p:txBody>
+      </p:sp>
+    </p:spTree>
+    <p:extLst>
+      <p:ext uri="{BB962C8B-B14F-4D97-AF65-F5344CB8AC3E}">
+        <p14:creationId xmlns:p14="http://schemas.microsoft.com/office/powerpoint/2010/main" val="179682219"/>
+      </p:ext>
+    </p:extLst>
+  </p:cSld>
+  <p:clrMapOvr>
+    <a:masterClrMapping/>
+  </p:clrMapOvr>
+</p:sld>
+</file>
+
+<file path=ppt/slides/slide8.xml><?xml version="1.0" encoding="utf-8"?>
+<p:sld xmlns:a="http://schemas.openxmlformats.org/drawingml/2006/main" xmlns:r="http://schemas.openxmlformats.org/officeDocument/2006/relationships" xmlns:p="http://schemas.openxmlformats.org/presentationml/2006/main">
+  <p:cSld>
+    <p:spTree>
+      <p:nvGrpSpPr>
+        <p:cNvPr id="1" name=""/>
+        <p:cNvGrpSpPr/>
+        <p:nvPr/>
+      </p:nvGrpSpPr>
+      <p:grpSpPr>
+        <a:xfrm>
+          <a:off x="0" y="0"/>
+          <a:ext cx="0" cy="0"/>
+          <a:chOff x="0" y="0"/>
+          <a:chExt cx="0" cy="0"/>
+        </a:xfrm>
+      </p:grpSpPr>
+      <p:sp>
+        <p:nvSpPr>
+          <p:cNvPr id="2" name="Title 1">
+            <a:extLst>
+              <a:ext uri="{FF2B5EF4-FFF2-40B4-BE49-F238E27FC236}">
+                <a16:creationId xmlns:a16="http://schemas.microsoft.com/office/drawing/2014/main" id="{2AD454E4-1C22-4481-92BE-AC36DF88F7B5}"/>
+              </a:ext>
+            </a:extLst>
+          </p:cNvPr>
+          <p:cNvSpPr>
+            <a:spLocks noGrp="1"/>
+          </p:cNvSpPr>
+          <p:nvPr>
+            <p:ph type="title"/>
+          </p:nvPr>
+        </p:nvSpPr>
+        <p:spPr/>
+        <p:txBody>
+          <a:bodyPr/>
+          <a:lstStyle/>
+          <a:p>
+            <a:r>
+              <a:rPr lang="en-US" dirty="0"/>
+              <a:t>Pipeline Testing</a:t>
+            </a:r>
+          </a:p>
+        </p:txBody>
+      </p:sp>
+      <p:sp>
+        <p:nvSpPr>
+          <p:cNvPr id="3" name="Content Placeholder 2">
+            <a:extLst>
+              <a:ext uri="{FF2B5EF4-FFF2-40B4-BE49-F238E27FC236}">
+                <a16:creationId xmlns:a16="http://schemas.microsoft.com/office/drawing/2014/main" id="{40E91D2B-9D28-47DE-B864-4F474D6E7EE6}"/>
+              </a:ext>
+            </a:extLst>
+          </p:cNvPr>
+          <p:cNvSpPr>
+            <a:spLocks noGrp="1"/>
+          </p:cNvSpPr>
+          <p:nvPr>
+            <p:ph idx="1"/>
+          </p:nvPr>
+        </p:nvSpPr>
+        <p:spPr/>
+        <p:txBody>
+          <a:bodyPr/>
+          <a:lstStyle/>
+          <a:p>
+            <a:r>
+              <a:rPr lang="en-US" b="1" dirty="0" err="1"/>
+              <a:t>Doctesting</a:t>
+            </a:r>
+            <a:r>
+              <a:rPr lang="en-US" dirty="0"/>
+              <a:t> [python] </a:t>
+            </a:r>
+          </a:p>
+          <a:p>
+            <a:pPr marL="0" indent="0">
+              <a:buNone/>
+            </a:pPr>
+            <a:r>
+              <a:rPr lang="en-US" dirty="0"/>
+              <a:t> </a:t>
+            </a:r>
+          </a:p>
+          <a:p>
+            <a:r>
+              <a:rPr lang="en-US" b="1" dirty="0"/>
+              <a:t>Unit Testing: </a:t>
+            </a:r>
+            <a:r>
+              <a:rPr lang="en-US" dirty="0"/>
+              <a:t>Using Data from the </a:t>
+            </a:r>
+            <a:r>
+              <a:rPr lang="en-US" dirty="0" err="1"/>
+              <a:t>BeatAML</a:t>
+            </a:r>
+            <a:r>
+              <a:rPr lang="en-US" dirty="0"/>
+              <a:t> (Sorafenib, n=851), run the HNSCC pipeline and compare output to </a:t>
+            </a:r>
+            <a:r>
+              <a:rPr lang="en-US" dirty="0" err="1"/>
+              <a:t>BeatAML</a:t>
+            </a:r>
+            <a:r>
+              <a:rPr lang="en-US" dirty="0"/>
+              <a:t> reported values. </a:t>
+            </a:r>
+          </a:p>
+          <a:p>
+            <a:pPr lvl="2"/>
+            <a:r>
+              <a:rPr lang="en-US" dirty="0"/>
+              <a:t>Compare AUC calculation, allow deviance due to minor fitting differences </a:t>
+            </a:r>
+          </a:p>
+          <a:p>
+            <a:pPr lvl="2"/>
+            <a:r>
+              <a:rPr lang="en-US" dirty="0"/>
+              <a:t>Compare Sensitivity Assignment, allow no deviance</a:t>
+            </a:r>
+          </a:p>
+          <a:p>
+            <a:pPr lvl="2"/>
+            <a:endParaRPr lang="en-US" dirty="0"/>
+          </a:p>
+          <a:p>
+            <a:r>
+              <a:rPr lang="en-US" b="1" dirty="0"/>
+              <a:t>Travis.CI</a:t>
+            </a:r>
+            <a:r>
+              <a:rPr lang="en-US" dirty="0"/>
+              <a:t>, commit triggered &amp; cloud hosted build testing. </a:t>
+            </a:r>
+          </a:p>
+        </p:txBody>
+      </p:sp>
+    </p:spTree>
+    <p:extLst>
+      <p:ext uri="{BB962C8B-B14F-4D97-AF65-F5344CB8AC3E}">
+        <p14:creationId xmlns:p14="http://schemas.microsoft.com/office/powerpoint/2010/main" val="3396710390"/>
+      </p:ext>
+    </p:extLst>
+  </p:cSld>
+  <p:clrMapOvr>
+    <a:masterClrMapping/>
+  </p:clrMapOvr>
+</p:sld>
+</file>
+
 <file path=ppt/slides/slide9.xml><?xml version="1.0" encoding="utf-8"?>
 <p:sld xmlns:a="http://schemas.openxmlformats.org/drawingml/2006/main" xmlns:r="http://schemas.openxmlformats.org/officeDocument/2006/relationships" xmlns:p="http://schemas.openxmlformats.org/presentationml/2006/main">
   <p:cSld>
@@ -15345,7 +14781,7 @@
           <p:cNvPr id="2" name="Title 1">
             <a:extLst>
               <a:ext uri="{FF2B5EF4-FFF2-40B4-BE49-F238E27FC236}">
-                <a16:creationId xmlns:a16="http://schemas.microsoft.com/office/drawing/2014/main" id="{95F4178F-5881-4F84-83BA-DA9F13D48F50}"/>
+                <a16:creationId xmlns:a16="http://schemas.microsoft.com/office/drawing/2014/main" id="{C3E23411-9DEB-44BA-A868-D15684B128C3}"/>
               </a:ext>
             </a:extLst>
           </p:cNvPr>
@@ -15363,7 +14799,7 @@
           <a:p>
             <a:r>
               <a:rPr lang="en-US" dirty="0"/>
-              <a:t>Documentation</a:t>
+              <a:t>Pipeline Validation (power analysis)</a:t>
             </a:r>
           </a:p>
         </p:txBody>
@@ -15373,7 +14809,7 @@
           <p:cNvPr id="3" name="Content Placeholder 2">
             <a:extLst>
               <a:ext uri="{FF2B5EF4-FFF2-40B4-BE49-F238E27FC236}">
-                <a16:creationId xmlns:a16="http://schemas.microsoft.com/office/drawing/2014/main" id="{10119908-95F5-4256-80FB-49412F64EF4D}"/>
+                <a16:creationId xmlns:a16="http://schemas.microsoft.com/office/drawing/2014/main" id="{4922B9ED-DDE8-4E5F-A9B6-33046050B172}"/>
               </a:ext>
             </a:extLst>
           </p:cNvPr>
@@ -15384,78 +14820,115 @@
             <p:ph idx="1"/>
           </p:nvPr>
         </p:nvSpPr>
-        <p:spPr/>
+        <p:spPr>
+          <a:xfrm>
+            <a:off x="838199" y="1825625"/>
+            <a:ext cx="10644052" cy="4351338"/>
+          </a:xfrm>
+        </p:spPr>
         <p:txBody>
           <a:bodyPr/>
           <a:lstStyle/>
           <a:p>
             <a:r>
               <a:rPr lang="en-US" dirty="0"/>
-              <a:t>All code and documentation is stored in a private </a:t>
+              <a:t>Simulate data using `</a:t>
             </a:r>
             <a:r>
               <a:rPr lang="en-US" dirty="0" err="1"/>
-              <a:t>github</a:t>
+              <a:t>synthetic_doseresponse_generator</a:t>
             </a:r>
             <a:r>
               <a:rPr lang="en-US" dirty="0"/>
-              <a:t> repo. </a:t>
-            </a:r>
-            <a:r>
-              <a:rPr lang="en-US" sz="2000" dirty="0"/>
+              <a:t>` output.  </a:t>
+            </a:r>
+            <a:r>
+              <a:rPr lang="en-US" sz="1800" dirty="0"/>
               <a:t>(</a:t>
             </a:r>
             <a:r>
-              <a:rPr lang="en-US" sz="2000" dirty="0">
+              <a:rPr lang="en-US" sz="1800" dirty="0">
                 <a:hlinkClick r:id="rId2"/>
               </a:rPr>
-              <a:t>https://github.com/nathanieljevans/HNSCC_functional_data_pipeline</a:t>
-            </a:r>
-            <a:r>
-              <a:rPr lang="en-US" sz="2000" dirty="0"/>
+              <a:t>https://github.com/nathanieljevans/synthetic_doseresponse_generator</a:t>
+            </a:r>
+            <a:r>
+              <a:rPr lang="en-US" sz="1800" dirty="0"/>
               <a:t>) </a:t>
             </a:r>
           </a:p>
           <a:p>
             <a:r>
               <a:rPr lang="en-US" dirty="0"/>
-              <a:t>Wiki Pages; Wet-lab protocols, </a:t>
-            </a:r>
-            <a:r>
-              <a:rPr lang="en-US" dirty="0" err="1"/>
-              <a:t>DR_ViewerApp_Tutorial</a:t>
-            </a:r>
-            <a:r>
-              <a:rPr lang="en-US" dirty="0"/>
-              <a:t>, etc. </a:t>
-            </a:r>
-          </a:p>
-          <a:p>
-            <a:r>
-              <a:rPr lang="en-US" dirty="0"/>
-              <a:t>Issues – Bug tracking, feature requests, </a:t>
-            </a:r>
-            <a:r>
-              <a:rPr lang="en-US" dirty="0" err="1"/>
-              <a:t>etc</a:t>
-            </a:r>
-            <a:endParaRPr lang="en-US" dirty="0"/>
-          </a:p>
-          <a:p>
-            <a:r>
-              <a:rPr lang="en-US" dirty="0"/>
-              <a:t>Data Dictionary </a:t>
-            </a:r>
-          </a:p>
-          <a:p>
-            <a:endParaRPr lang="en-US" dirty="0"/>
-          </a:p>
-        </p:txBody>
-      </p:sp>
+              <a:t>Compare HNSCC-pipeline AUC to synthetic AUC and vary noise/replicates</a:t>
+            </a:r>
+          </a:p>
+        </p:txBody>
+      </p:sp>
+      <p:pic>
+        <p:nvPicPr>
+          <p:cNvPr id="6" name="Picture 5">
+            <a:extLst>
+              <a:ext uri="{FF2B5EF4-FFF2-40B4-BE49-F238E27FC236}">
+                <a16:creationId xmlns:a16="http://schemas.microsoft.com/office/drawing/2014/main" id="{F2906CE9-2C81-4BFA-9F8F-4BB2BAC85A57}"/>
+              </a:ext>
+            </a:extLst>
+          </p:cNvPr>
+          <p:cNvPicPr>
+            <a:picLocks noChangeAspect="1"/>
+          </p:cNvPicPr>
+          <p:nvPr/>
+        </p:nvPicPr>
+        <p:blipFill>
+          <a:blip r:embed="rId3"/>
+          <a:stretch>
+            <a:fillRect/>
+          </a:stretch>
+        </p:blipFill>
+        <p:spPr>
+          <a:xfrm>
+            <a:off x="1005840" y="-336008"/>
+            <a:ext cx="7325360" cy="6828883"/>
+          </a:xfrm>
+          <a:prstGeom prst="rect">
+            <a:avLst/>
+          </a:prstGeom>
+        </p:spPr>
+      </p:pic>
+      <p:pic>
+        <p:nvPicPr>
+          <p:cNvPr id="7" name="Picture 6">
+            <a:extLst>
+              <a:ext uri="{FF2B5EF4-FFF2-40B4-BE49-F238E27FC236}">
+                <a16:creationId xmlns:a16="http://schemas.microsoft.com/office/drawing/2014/main" id="{C1CAE2DF-0450-443F-BCC5-E7D838F7882A}"/>
+              </a:ext>
+            </a:extLst>
+          </p:cNvPr>
+          <p:cNvPicPr>
+            <a:picLocks noChangeAspect="1"/>
+          </p:cNvPicPr>
+          <p:nvPr/>
+        </p:nvPicPr>
+        <p:blipFill>
+          <a:blip r:embed="rId4"/>
+          <a:stretch>
+            <a:fillRect/>
+          </a:stretch>
+        </p:blipFill>
+        <p:spPr>
+          <a:xfrm>
+            <a:off x="9160058" y="3365269"/>
+            <a:ext cx="3198856" cy="2946631"/>
+          </a:xfrm>
+          <a:prstGeom prst="rect">
+            <a:avLst/>
+          </a:prstGeom>
+        </p:spPr>
+      </p:pic>
     </p:spTree>
     <p:extLst>
       <p:ext uri="{BB962C8B-B14F-4D97-AF65-F5344CB8AC3E}">
-        <p14:creationId xmlns:p14="http://schemas.microsoft.com/office/powerpoint/2010/main" val="179682219"/>
+        <p14:creationId xmlns:p14="http://schemas.microsoft.com/office/powerpoint/2010/main" val="3586464873"/>
       </p:ext>
     </p:extLst>
   </p:cSld>

</xml_diff>